<commit_message>
Added CSV file of top tourist destinations.
</commit_message>
<xml_diff>
--- a/Trip_Planner_Pipeline.pptx
+++ b/Trip_Planner_Pipeline.pptx
@@ -4189,14 +4189,14 @@
       </p:sp>
       <p:sp>
         <p:nvSpPr>
-          <p:cNvPr id="3" name="TextBox 2"/>
+          <p:cNvPr id="5" name="TextBox 4"/>
           <p:cNvSpPr txBox="1"/>
           <p:nvPr/>
         </p:nvSpPr>
         <p:spPr>
           <a:xfrm>
-            <a:off x="2647527" y="1166692"/>
-            <a:ext cx="3339376" cy="369332"/>
+            <a:off x="2451197" y="3344943"/>
+            <a:ext cx="4031873" cy="369332"/>
           </a:xfrm>
           <a:prstGeom prst="rect">
             <a:avLst/>
@@ -4211,7 +4211,7 @@
           <a:p>
             <a:r>
               <a:rPr lang="en-US" dirty="0" smtClean="0"/>
-              <a:t>Where are you currently located?</a:t>
+              <a:t>Do you want to vacation in a warm area?</a:t>
             </a:r>
             <a:endParaRPr lang="en-US" dirty="0"/>
           </a:p>
@@ -4219,14 +4219,14 @@
       </p:sp>
       <p:sp>
         <p:nvSpPr>
-          <p:cNvPr id="5" name="TextBox 4"/>
+          <p:cNvPr id="6" name="TextBox 5"/>
           <p:cNvSpPr txBox="1"/>
           <p:nvPr/>
         </p:nvSpPr>
         <p:spPr>
           <a:xfrm>
-            <a:off x="2451197" y="3344943"/>
-            <a:ext cx="4031873" cy="369332"/>
+            <a:off x="1276119" y="291893"/>
+            <a:ext cx="6649214" cy="646331"/>
           </a:xfrm>
           <a:prstGeom prst="rect">
             <a:avLst/>
@@ -4239,40 +4239,22 @@
           </a:bodyPr>
           <a:lstStyle/>
           <a:p>
+            <a:pPr algn="ctr"/>
             <a:r>
               <a:rPr lang="en-US" dirty="0" smtClean="0"/>
-              <a:t>Do you want to vacation in a warm area?</a:t>
-            </a:r>
-            <a:endParaRPr lang="en-US" dirty="0"/>
-          </a:p>
-        </p:txBody>
-      </p:sp>
-      <p:sp>
-        <p:nvSpPr>
-          <p:cNvPr id="6" name="TextBox 5"/>
-          <p:cNvSpPr txBox="1"/>
-          <p:nvPr/>
-        </p:nvSpPr>
-        <p:spPr>
-          <a:xfrm>
-            <a:off x="1455946" y="291893"/>
-            <a:ext cx="6289552" cy="646331"/>
-          </a:xfrm>
-          <a:prstGeom prst="rect">
-            <a:avLst/>
-          </a:prstGeom>
-          <a:noFill/>
-        </p:spPr>
-        <p:txBody>
-          <a:bodyPr wrap="none" rtlCol="0">
-            <a:spAutoFit/>
-          </a:bodyPr>
-          <a:lstStyle/>
-          <a:p>
-            <a:pPr algn="ctr"/>
+              <a:t>THIS PAGE TO BE USED ONLY IF DESIRED </a:t>
+            </a:r>
             <a:r>
               <a:rPr lang="en-US" dirty="0" smtClean="0"/>
-              <a:t>THIS PAGE TO BE USED ONLY IF DESIRED LOCATION IS UNKNOWN</a:t>
+              <a:t>DESTINATION</a:t>
+            </a:r>
+            <a:r>
+              <a:rPr lang="en-US" dirty="0" smtClean="0"/>
+              <a:t> </a:t>
+            </a:r>
+            <a:r>
+              <a:rPr lang="en-US" dirty="0" smtClean="0"/>
+              <a:t>IS UNKNOWN</a:t>
             </a:r>
           </a:p>
           <a:p>
@@ -4293,7 +4275,7 @@
         </p:nvSpPr>
         <p:spPr>
           <a:xfrm>
-            <a:off x="581368" y="265264"/>
+            <a:off x="581368" y="307424"/>
             <a:ext cx="7377639" cy="672960"/>
           </a:xfrm>
           <a:prstGeom prst="rect">
@@ -4330,14 +4312,14 @@
       </p:sp>
       <p:sp>
         <p:nvSpPr>
-          <p:cNvPr id="8" name="Rectangle 7"/>
+          <p:cNvPr id="9" name="Rectangle 8"/>
           <p:cNvSpPr/>
           <p:nvPr/>
         </p:nvSpPr>
         <p:spPr>
           <a:xfrm>
-            <a:off x="2689485" y="1143319"/>
-            <a:ext cx="3297418" cy="596892"/>
+            <a:off x="2328524" y="2114765"/>
+            <a:ext cx="4035730" cy="672960"/>
           </a:xfrm>
           <a:prstGeom prst="rect">
             <a:avLst/>
@@ -4373,14 +4355,14 @@
       </p:sp>
       <p:sp>
         <p:nvSpPr>
-          <p:cNvPr id="9" name="Rectangle 8"/>
+          <p:cNvPr id="10" name="Rectangle 9"/>
           <p:cNvSpPr/>
           <p:nvPr/>
         </p:nvSpPr>
         <p:spPr>
           <a:xfrm>
-            <a:off x="2328524" y="2114765"/>
-            <a:ext cx="4035730" cy="672960"/>
+            <a:off x="2328524" y="3194092"/>
+            <a:ext cx="4212926" cy="672960"/>
           </a:xfrm>
           <a:prstGeom prst="rect">
             <a:avLst/>
@@ -4414,82 +4396,6 @@
           </a:p>
         </p:txBody>
       </p:sp>
-      <p:sp>
-        <p:nvSpPr>
-          <p:cNvPr id="10" name="Rectangle 9"/>
-          <p:cNvSpPr/>
-          <p:nvPr/>
-        </p:nvSpPr>
-        <p:spPr>
-          <a:xfrm>
-            <a:off x="2328524" y="3194092"/>
-            <a:ext cx="4212926" cy="672960"/>
-          </a:xfrm>
-          <a:prstGeom prst="rect">
-            <a:avLst/>
-          </a:prstGeom>
-          <a:solidFill>
-            <a:schemeClr val="accent5">
-              <a:alpha val="18000"/>
-            </a:schemeClr>
-          </a:solidFill>
-        </p:spPr>
-        <p:style>
-          <a:lnRef idx="1">
-            <a:schemeClr val="accent1"/>
-          </a:lnRef>
-          <a:fillRef idx="3">
-            <a:schemeClr val="accent1"/>
-          </a:fillRef>
-          <a:effectRef idx="2">
-            <a:schemeClr val="accent1"/>
-          </a:effectRef>
-          <a:fontRef idx="minor">
-            <a:schemeClr val="lt1"/>
-          </a:fontRef>
-        </p:style>
-        <p:txBody>
-          <a:bodyPr rtlCol="0" anchor="ctr"/>
-          <a:lstStyle/>
-          <a:p>
-            <a:pPr algn="ctr"/>
-            <a:endParaRPr lang="en-US"/>
-          </a:p>
-        </p:txBody>
-      </p:sp>
-      <p:cxnSp>
-        <p:nvCxnSpPr>
-          <p:cNvPr id="11" name="Straight Arrow Connector 10"/>
-          <p:cNvCxnSpPr/>
-          <p:nvPr/>
-        </p:nvCxnSpPr>
-        <p:spPr>
-          <a:xfrm>
-            <a:off x="4125320" y="1740211"/>
-            <a:ext cx="0" cy="374554"/>
-          </a:xfrm>
-          <a:prstGeom prst="straightConnector1">
-            <a:avLst/>
-          </a:prstGeom>
-          <a:ln w="63500">
-            <a:tailEnd type="arrow"/>
-          </a:ln>
-        </p:spPr>
-        <p:style>
-          <a:lnRef idx="2">
-            <a:schemeClr val="accent1"/>
-          </a:lnRef>
-          <a:fillRef idx="0">
-            <a:schemeClr val="accent1"/>
-          </a:fillRef>
-          <a:effectRef idx="1">
-            <a:schemeClr val="accent1"/>
-          </a:effectRef>
-          <a:fontRef idx="minor">
-            <a:schemeClr val="tx1"/>
-          </a:fontRef>
-        </p:style>
-      </p:cxnSp>
       <p:cxnSp>
         <p:nvCxnSpPr>
           <p:cNvPr id="13" name="Straight Arrow Connector 12"/>

</xml_diff>